<commit_message>
Updates to APS talk
</commit_message>
<xml_diff>
--- a/Presentations/APS_April2021/tropiano_aps_april2021.pptx
+++ b/Presentations/APS_April2021/tropiano_aps_april2021.pptx
@@ -9885,8 +9885,9 @@
                                   <a:srgbClr val="C00000"/>
                                 </a:solidFill>
                                 <a:latin typeface="Cambria Math" panose="02040503050406030204" pitchFamily="18" charset="0"/>
+                                <a:ea typeface="Cambria Math" panose="02040503050406030204" pitchFamily="18" charset="0"/>
                               </a:rPr>
-                              <m:t>𝐴</m:t>
+                              <m:t>𝑓</m:t>
                             </m:r>
                           </m:sub>
                           <m:sup>
@@ -10133,8 +10134,9 @@
                                   <a:srgbClr val="C00000"/>
                                 </a:solidFill>
                                 <a:latin typeface="Cambria Math" panose="02040503050406030204" pitchFamily="18" charset="0"/>
+                                <a:ea typeface="Cambria Math" panose="02040503050406030204" pitchFamily="18" charset="0"/>
                               </a:rPr>
-                              <m:t>𝐴</m:t>
+                              <m:t>𝑖</m:t>
                             </m:r>
                           </m:sub>
                           <m:sup>
@@ -23072,14 +23074,14 @@
                               </m:sub>
                               <m:sup>
                                 <m:r>
-                                  <a:rPr lang="en-US" i="1">
+                                  <a:rPr lang="en-US" b="0" i="1" smtClean="0">
                                     <a:solidFill>
                                       <a:srgbClr val="002060"/>
                                     </a:solidFill>
                                     <a:latin typeface="Cambria Math" panose="02040503050406030204" pitchFamily="18" charset="0"/>
                                     <a:ea typeface="Cambria Math" panose="02040503050406030204" pitchFamily="18" charset="0"/>
                                   </a:rPr>
-                                  <m:t>𝑙𝑜</m:t>
+                                  <m:t>h𝑖</m:t>
                                 </m:r>
                               </m:sup>
                             </m:sSubSup>
@@ -23426,7 +23428,7 @@
         </p:nvSpPr>
         <p:spPr>
           <a:xfrm>
-            <a:off x="883920" y="1634297"/>
+            <a:off x="883920" y="1563276"/>
             <a:ext cx="10424160" cy="4351338"/>
           </a:xfrm>
         </p:spPr>
@@ -25297,13 +25299,85 @@
         </p:nvSpPr>
         <p:spPr>
           <a:xfrm>
-            <a:off x="8744505" y="2302299"/>
-            <a:ext cx="3415365" cy="3786943"/>
+            <a:off x="8700115" y="2302299"/>
+            <a:ext cx="3249229" cy="3786943"/>
           </a:xfrm>
         </p:spPr>
         <p:txBody>
-          <a:bodyPr/>
+          <a:bodyPr>
+            <a:normAutofit lnSpcReduction="10000"/>
+          </a:bodyPr>
           <a:lstStyle/>
+          <a:p>
+            <a:pPr marL="228600" marR="0" lvl="0" indent="-228600" algn="l" defTabSz="914400" rtl="0" eaLnBrk="1" fontAlgn="auto" latinLnBrk="0" hangingPunct="1">
+              <a:lnSpc>
+                <a:spcPct val="100000"/>
+              </a:lnSpc>
+              <a:spcBef>
+                <a:spcPts val="1000"/>
+              </a:spcBef>
+              <a:spcAft>
+                <a:spcPts val="0"/>
+              </a:spcAft>
+              <a:buClrTx/>
+              <a:buSzTx/>
+              <a:buFont typeface="Arial" panose="020B0604020202020204" pitchFamily="34" charset="0"/>
+              <a:buChar char="•"/>
+              <a:tabLst/>
+              <a:defRPr/>
+            </a:pPr>
+            <a:r>
+              <a:rPr kumimoji="0" lang="en-US" sz="2200" b="0" i="0" u="none" strike="noStrike" kern="1200" cap="none" spc="0" normalizeH="0" baseline="0" noProof="0" dirty="0">
+                <a:ln>
+                  <a:noFill/>
+                </a:ln>
+                <a:solidFill>
+                  <a:prstClr val="black"/>
+                </a:solidFill>
+                <a:effectLst/>
+                <a:uLnTx/>
+                <a:uFillTx/>
+                <a:latin typeface="Arial" panose="020B0604020202020204" pitchFamily="34" charset="0"/>
+                <a:ea typeface="+mn-ea"/>
+                <a:cs typeface="+mn-cs"/>
+              </a:rPr>
+              <a:t>At </a:t>
+            </a:r>
+            <a:r>
+              <a:rPr kumimoji="0" lang="en-US" sz="2200" b="0" i="0" u="none" strike="noStrike" kern="1200" cap="none" spc="0" normalizeH="0" baseline="0" noProof="0" dirty="0">
+                <a:ln>
+                  <a:noFill/>
+                </a:ln>
+                <a:solidFill>
+                  <a:srgbClr val="C00000"/>
+                </a:solidFill>
+                <a:effectLst/>
+                <a:uLnTx/>
+                <a:uFillTx/>
+                <a:latin typeface="Arial" panose="020B0604020202020204" pitchFamily="34" charset="0"/>
+                <a:ea typeface="+mn-ea"/>
+                <a:cs typeface="+mn-cs"/>
+              </a:rPr>
+              <a:t>high RG resolution</a:t>
+            </a:r>
+            <a:r>
+              <a:rPr kumimoji="0" lang="en-US" sz="2200" b="0" i="0" u="none" strike="noStrike" kern="1200" cap="none" spc="0" normalizeH="0" baseline="0" noProof="0" dirty="0">
+                <a:ln>
+                  <a:noFill/>
+                </a:ln>
+                <a:solidFill>
+                  <a:prstClr val="black"/>
+                </a:solidFill>
+                <a:effectLst/>
+                <a:uLnTx/>
+                <a:uFillTx/>
+                <a:latin typeface="Arial" panose="020B0604020202020204" pitchFamily="34" charset="0"/>
+                <a:ea typeface="+mn-ea"/>
+                <a:cs typeface="+mn-cs"/>
+              </a:rPr>
+              <a:t>, the tensor force and the repulsive core of the NN interaction kicks nucleon pairs into SRCs</a:t>
+            </a:r>
+          </a:p>
           <a:p>
             <a:pPr>
               <a:lnSpc>
@@ -25311,9 +25385,27 @@
               </a:lnSpc>
             </a:pPr>
             <a:r>
-              <a:rPr lang="en-US" sz="2400" dirty="0"/>
-              <a:t>pp pairs are spin-singlets whereas the tensor force requires spin-triplets</a:t>
-            </a:r>
+              <a:rPr kumimoji="0" lang="en-US" sz="2200" b="0" i="0" u="none" strike="noStrike" kern="1200" cap="none" spc="0" normalizeH="0" baseline="0" noProof="0" dirty="0">
+                <a:ln>
+                  <a:noFill/>
+                </a:ln>
+                <a:solidFill>
+                  <a:prstClr val="black"/>
+                </a:solidFill>
+                <a:effectLst/>
+                <a:uLnTx/>
+                <a:uFillTx/>
+                <a:latin typeface="Arial" panose="020B0604020202020204" pitchFamily="34" charset="0"/>
+                <a:ea typeface="+mn-ea"/>
+                <a:cs typeface="+mn-cs"/>
+              </a:rPr>
+              <a:t>np dominates because the tensor force requires spin triplet pairs (pp are spin singlets)</a:t>
+            </a:r>
+            <a:endParaRPr lang="en-US" sz="2400" dirty="0">
+              <a:solidFill>
+                <a:srgbClr val="C00000"/>
+              </a:solidFill>
+            </a:endParaRPr>
           </a:p>
           <a:p>
             <a:pPr>
@@ -25321,22 +25413,11 @@
                 <a:spcPct val="100000"/>
               </a:lnSpc>
             </a:pPr>
-            <a:r>
-              <a:rPr lang="en-US" sz="2400" dirty="0" err="1">
-                <a:solidFill>
-                  <a:srgbClr val="C00000"/>
-                </a:solidFill>
-              </a:rPr>
-              <a:t>pn</a:t>
-            </a:r>
-            <a:r>
-              <a:rPr lang="en-US" sz="2400" dirty="0">
-                <a:solidFill>
-                  <a:srgbClr val="C00000"/>
-                </a:solidFill>
-              </a:rPr>
-              <a:t> pairs dominate in region of tensor force</a:t>
-            </a:r>
+            <a:endParaRPr lang="en-US" sz="2400" dirty="0">
+              <a:solidFill>
+                <a:srgbClr val="C00000"/>
+              </a:solidFill>
+            </a:endParaRPr>
           </a:p>
           <a:p>
             <a:pPr>
@@ -26202,79 +26283,6 @@
           </a:fontRef>
         </p:style>
       </p:cxnSp>
-      <p:sp>
-        <p:nvSpPr>
-          <p:cNvPr id="19" name="Content Placeholder 2">
-            <a:extLst>
-              <a:ext uri="{FF2B5EF4-FFF2-40B4-BE49-F238E27FC236}">
-                <a16:creationId xmlns:a16="http://schemas.microsoft.com/office/drawing/2014/main" id="{A5458AE5-671B-4475-822B-560A4AD76C89}"/>
-              </a:ext>
-            </a:extLst>
-          </p:cNvPr>
-          <p:cNvSpPr>
-            <a:spLocks noGrp="1"/>
-          </p:cNvSpPr>
-          <p:nvPr>
-            <p:ph idx="1"/>
-          </p:nvPr>
-        </p:nvSpPr>
-        <p:spPr>
-          <a:xfrm>
-            <a:off x="8744505" y="2302299"/>
-            <a:ext cx="3415365" cy="3786943"/>
-          </a:xfrm>
-        </p:spPr>
-        <p:txBody>
-          <a:bodyPr/>
-          <a:lstStyle/>
-          <a:p>
-            <a:pPr>
-              <a:lnSpc>
-                <a:spcPct val="100000"/>
-              </a:lnSpc>
-            </a:pPr>
-            <a:r>
-              <a:rPr lang="en-US" sz="2400" dirty="0"/>
-              <a:t>pp pairs are spin-singlets whereas the tensor force requires spin-triplets</a:t>
-            </a:r>
-          </a:p>
-          <a:p>
-            <a:pPr>
-              <a:lnSpc>
-                <a:spcPct val="100000"/>
-              </a:lnSpc>
-            </a:pPr>
-            <a:r>
-              <a:rPr lang="en-US" sz="2400" dirty="0" err="1">
-                <a:solidFill>
-                  <a:srgbClr val="C00000"/>
-                </a:solidFill>
-              </a:rPr>
-              <a:t>pn</a:t>
-            </a:r>
-            <a:r>
-              <a:rPr lang="en-US" sz="2400" dirty="0">
-                <a:solidFill>
-                  <a:srgbClr val="C00000"/>
-                </a:solidFill>
-              </a:rPr>
-              <a:t> pairs dominate in region of tensor force</a:t>
-            </a:r>
-          </a:p>
-          <a:p>
-            <a:pPr>
-              <a:lnSpc>
-                <a:spcPct val="100000"/>
-              </a:lnSpc>
-            </a:pPr>
-            <a:endParaRPr lang="en-US" dirty="0">
-              <a:solidFill>
-                <a:srgbClr val="C00000"/>
-              </a:solidFill>
-            </a:endParaRPr>
-          </a:p>
-        </p:txBody>
-      </p:sp>
       <p:pic>
         <p:nvPicPr>
           <p:cNvPr id="9" name="Picture 8" descr="Diagram&#10;&#10;Description automatically generated">
@@ -26536,6 +26544,388 @@
           </a:fontRef>
         </p:style>
       </p:cxnSp>
+      <mc:AlternateContent xmlns:mc="http://schemas.openxmlformats.org/markup-compatibility/2006">
+        <mc:Choice xmlns:a14="http://schemas.microsoft.com/office/drawing/2010/main" Requires="a14">
+          <p:sp>
+            <p:nvSpPr>
+              <p:cNvPr id="28" name="Content Placeholder 2">
+                <a:extLst>
+                  <a:ext uri="{FF2B5EF4-FFF2-40B4-BE49-F238E27FC236}">
+                    <a16:creationId xmlns:a16="http://schemas.microsoft.com/office/drawing/2014/main" id="{B663AEBB-EB90-4D5D-B759-BEC015C34B9A}"/>
+                  </a:ext>
+                </a:extLst>
+              </p:cNvPr>
+              <p:cNvSpPr>
+                <a:spLocks noGrp="1"/>
+              </p:cNvSpPr>
+              <p:nvPr>
+                <p:ph idx="1"/>
+              </p:nvPr>
+            </p:nvSpPr>
+            <p:spPr>
+              <a:xfrm>
+                <a:off x="8700115" y="2302299"/>
+                <a:ext cx="3249229" cy="3786943"/>
+              </a:xfrm>
+            </p:spPr>
+            <p:txBody>
+              <a:bodyPr>
+                <a:normAutofit/>
+              </a:bodyPr>
+              <a:lstStyle/>
+              <a:p>
+                <a:pPr marL="228600" marR="0" lvl="0" indent="-228600" algn="l" defTabSz="914400" rtl="0" eaLnBrk="1" fontAlgn="auto" latinLnBrk="0" hangingPunct="1">
+                  <a:lnSpc>
+                    <a:spcPct val="100000"/>
+                  </a:lnSpc>
+                  <a:spcBef>
+                    <a:spcPts val="1000"/>
+                  </a:spcBef>
+                  <a:spcAft>
+                    <a:spcPts val="0"/>
+                  </a:spcAft>
+                  <a:buClrTx/>
+                  <a:buSzTx/>
+                  <a:buFont typeface="Arial" panose="020B0604020202020204" pitchFamily="34" charset="0"/>
+                  <a:buChar char="•"/>
+                  <a:tabLst/>
+                  <a:defRPr/>
+                </a:pPr>
+                <a:r>
+                  <a:rPr kumimoji="0" lang="en-US" sz="2200" b="0" i="0" u="none" strike="noStrike" kern="1200" cap="none" spc="0" normalizeH="0" baseline="0" noProof="0" dirty="0">
+                    <a:ln>
+                      <a:noFill/>
+                    </a:ln>
+                    <a:solidFill>
+                      <a:prstClr val="black"/>
+                    </a:solidFill>
+                    <a:effectLst/>
+                    <a:uLnTx/>
+                    <a:uFillTx/>
+                    <a:latin typeface="Arial" panose="020B0604020202020204" pitchFamily="34" charset="0"/>
+                    <a:ea typeface="+mn-ea"/>
+                    <a:cs typeface="+mn-cs"/>
+                  </a:rPr>
+                  <a:t>At </a:t>
+                </a:r>
+                <a:r>
+                  <a:rPr kumimoji="0" lang="en-US" sz="2200" b="0" i="0" u="none" strike="noStrike" kern="1200" cap="none" spc="0" normalizeH="0" baseline="0" noProof="0" dirty="0">
+                    <a:ln>
+                      <a:noFill/>
+                    </a:ln>
+                    <a:solidFill>
+                      <a:srgbClr val="C00000"/>
+                    </a:solidFill>
+                    <a:effectLst/>
+                    <a:uLnTx/>
+                    <a:uFillTx/>
+                    <a:latin typeface="Arial" panose="020B0604020202020204" pitchFamily="34" charset="0"/>
+                    <a:ea typeface="+mn-ea"/>
+                    <a:cs typeface="+mn-cs"/>
+                  </a:rPr>
+                  <a:t>low RG resolution</a:t>
+                </a:r>
+                <a:r>
+                  <a:rPr kumimoji="0" lang="en-US" sz="2200" b="0" i="0" u="none" strike="noStrike" kern="1200" cap="none" spc="0" normalizeH="0" baseline="0" noProof="0" dirty="0">
+                    <a:ln>
+                      <a:noFill/>
+                    </a:ln>
+                    <a:solidFill>
+                      <a:prstClr val="black"/>
+                    </a:solidFill>
+                    <a:effectLst/>
+                    <a:uLnTx/>
+                    <a:uFillTx/>
+                    <a:latin typeface="Arial" panose="020B0604020202020204" pitchFamily="34" charset="0"/>
+                    <a:ea typeface="+mn-ea"/>
+                    <a:cs typeface="+mn-cs"/>
+                  </a:rPr>
+                  <a:t>, SRCs are suppressed in the wave function</a:t>
+                </a:r>
+              </a:p>
+              <a:p>
+                <a:pPr>
+                  <a:lnSpc>
+                    <a:spcPct val="100000"/>
+                  </a:lnSpc>
+                </a:pPr>
+                <a:r>
+                  <a:rPr lang="en-US" sz="2200" dirty="0"/>
+                  <a:t>Consider the ratio of </a:t>
+                </a:r>
+                <a:r>
+                  <a:rPr lang="en-US" sz="2200" baseline="30000" dirty="0">
+                    <a:solidFill>
+                      <a:srgbClr val="C00000"/>
+                    </a:solidFill>
+                  </a:rPr>
+                  <a:t>3</a:t>
+                </a:r>
+                <a:r>
+                  <a:rPr lang="en-US" sz="2200" dirty="0">
+                    <a:solidFill>
+                      <a:srgbClr val="C00000"/>
+                    </a:solidFill>
+                  </a:rPr>
+                  <a:t>S</a:t>
+                </a:r>
+                <a:r>
+                  <a:rPr lang="en-US" sz="2200" baseline="-25000" dirty="0">
+                    <a:solidFill>
+                      <a:srgbClr val="C00000"/>
+                    </a:solidFill>
+                  </a:rPr>
+                  <a:t>1</a:t>
+                </a:r>
+                <a:r>
+                  <a:rPr lang="en-US" sz="2200" dirty="0">
+                    <a:solidFill>
+                      <a:srgbClr val="C00000"/>
+                    </a:solidFill>
+                  </a:rPr>
+                  <a:t>-</a:t>
+                </a:r>
+                <a:r>
+                  <a:rPr lang="en-US" sz="2200" baseline="30000" dirty="0">
+                    <a:solidFill>
+                      <a:srgbClr val="C00000"/>
+                    </a:solidFill>
+                  </a:rPr>
+                  <a:t>3</a:t>
+                </a:r>
+                <a:r>
+                  <a:rPr lang="en-US" sz="2200" dirty="0">
+                    <a:solidFill>
+                      <a:srgbClr val="C00000"/>
+                    </a:solidFill>
+                  </a:rPr>
+                  <a:t>D</a:t>
+                </a:r>
+                <a:r>
+                  <a:rPr lang="en-US" sz="2200" baseline="-25000" dirty="0">
+                    <a:solidFill>
+                      <a:srgbClr val="C00000"/>
+                    </a:solidFill>
+                  </a:rPr>
+                  <a:t>1</a:t>
+                </a:r>
+                <a:r>
+                  <a:rPr lang="en-US" sz="2200" dirty="0">
+                    <a:solidFill>
+                      <a:srgbClr val="C00000"/>
+                    </a:solidFill>
+                  </a:rPr>
+                  <a:t> </a:t>
+                </a:r>
+                <a:r>
+                  <a:rPr lang="en-US" sz="2200" dirty="0"/>
+                  <a:t>to</a:t>
+                </a:r>
+                <a:r>
+                  <a:rPr lang="en-US" sz="2200" baseline="-25000" dirty="0">
+                    <a:solidFill>
+                      <a:srgbClr val="C00000"/>
+                    </a:solidFill>
+                  </a:rPr>
+                  <a:t> </a:t>
+                </a:r>
+                <a:r>
+                  <a:rPr lang="en-US" sz="2200" baseline="30000" dirty="0">
+                    <a:solidFill>
+                      <a:srgbClr val="C00000"/>
+                    </a:solidFill>
+                  </a:rPr>
+                  <a:t>1</a:t>
+                </a:r>
+                <a:r>
+                  <a:rPr lang="en-US" sz="2200" dirty="0">
+                    <a:solidFill>
+                      <a:srgbClr val="C00000"/>
+                    </a:solidFill>
+                  </a:rPr>
+                  <a:t>S</a:t>
+                </a:r>
+                <a:r>
+                  <a:rPr lang="en-US" sz="2200" baseline="-25000" dirty="0">
+                    <a:solidFill>
+                      <a:srgbClr val="C00000"/>
+                    </a:solidFill>
+                  </a:rPr>
+                  <a:t>0</a:t>
+                </a:r>
+                <a:r>
+                  <a:rPr lang="en-US" sz="2200" dirty="0">
+                    <a:solidFill>
+                      <a:srgbClr val="C00000"/>
+                    </a:solidFill>
+                  </a:rPr>
+                  <a:t> </a:t>
+                </a:r>
+                <a:r>
+                  <a:rPr lang="en-US" sz="2200" dirty="0"/>
+                  <a:t>evolved momentum projection operator </a:t>
+                </a:r>
+                <a14:m>
+                  <m:oMath xmlns:m="http://schemas.openxmlformats.org/officeDocument/2006/math">
+                    <m:sSubSup>
+                      <m:sSubSupPr>
+                        <m:ctrlPr>
+                          <a:rPr lang="en-US" sz="2200" i="1">
+                            <a:solidFill>
+                              <a:srgbClr val="C00000"/>
+                            </a:solidFill>
+                            <a:latin typeface="Cambria Math" panose="02040503050406030204" pitchFamily="18" charset="0"/>
+                          </a:rPr>
+                        </m:ctrlPr>
+                      </m:sSubSupPr>
+                      <m:e>
+                        <m:r>
+                          <a:rPr lang="en-US" sz="2200" i="1">
+                            <a:solidFill>
+                              <a:srgbClr val="C00000"/>
+                            </a:solidFill>
+                            <a:latin typeface="Cambria Math" panose="02040503050406030204" pitchFamily="18" charset="0"/>
+                          </a:rPr>
+                          <m:t>𝑎</m:t>
+                        </m:r>
+                      </m:e>
+                      <m:sub>
+                        <m:r>
+                          <a:rPr lang="en-US" sz="2200" i="1">
+                            <a:solidFill>
+                              <a:srgbClr val="C00000"/>
+                            </a:solidFill>
+                            <a:latin typeface="Cambria Math" panose="02040503050406030204" pitchFamily="18" charset="0"/>
+                          </a:rPr>
+                          <m:t>𝑞</m:t>
+                        </m:r>
+                      </m:sub>
+                      <m:sup>
+                        <m:r>
+                          <a:rPr lang="en-US" sz="2200" i="1">
+                            <a:solidFill>
+                              <a:srgbClr val="C00000"/>
+                            </a:solidFill>
+                            <a:latin typeface="Cambria Math" panose="02040503050406030204" pitchFamily="18" charset="0"/>
+                            <a:ea typeface="Cambria Math" panose="02040503050406030204" pitchFamily="18" charset="0"/>
+                          </a:rPr>
+                          <m:t>†</m:t>
+                        </m:r>
+                      </m:sup>
+                    </m:sSubSup>
+                    <m:sSub>
+                      <m:sSubPr>
+                        <m:ctrlPr>
+                          <a:rPr lang="en-US" sz="2200" i="1">
+                            <a:solidFill>
+                              <a:srgbClr val="C00000"/>
+                            </a:solidFill>
+                            <a:latin typeface="Cambria Math" panose="02040503050406030204" pitchFamily="18" charset="0"/>
+                          </a:rPr>
+                        </m:ctrlPr>
+                      </m:sSubPr>
+                      <m:e>
+                        <m:r>
+                          <a:rPr lang="en-US" sz="2200" i="1">
+                            <a:solidFill>
+                              <a:srgbClr val="C00000"/>
+                            </a:solidFill>
+                            <a:latin typeface="Cambria Math" panose="02040503050406030204" pitchFamily="18" charset="0"/>
+                          </a:rPr>
+                          <m:t>𝑎</m:t>
+                        </m:r>
+                      </m:e>
+                      <m:sub>
+                        <m:r>
+                          <a:rPr lang="en-US" sz="2200" i="1">
+                            <a:solidFill>
+                              <a:srgbClr val="C00000"/>
+                            </a:solidFill>
+                            <a:latin typeface="Cambria Math" panose="02040503050406030204" pitchFamily="18" charset="0"/>
+                          </a:rPr>
+                          <m:t>𝑞</m:t>
+                        </m:r>
+                      </m:sub>
+                    </m:sSub>
+                  </m:oMath>
+                </a14:m>
+                <a:endParaRPr lang="en-US" sz="2200" dirty="0">
+                  <a:solidFill>
+                    <a:srgbClr val="C00000"/>
+                  </a:solidFill>
+                </a:endParaRPr>
+              </a:p>
+              <a:p>
+                <a:pPr>
+                  <a:lnSpc>
+                    <a:spcPct val="100000"/>
+                  </a:lnSpc>
+                </a:pPr>
+                <a:endParaRPr lang="en-US" sz="2400" dirty="0">
+                  <a:solidFill>
+                    <a:srgbClr val="C00000"/>
+                  </a:solidFill>
+                </a:endParaRPr>
+              </a:p>
+              <a:p>
+                <a:pPr>
+                  <a:lnSpc>
+                    <a:spcPct val="100000"/>
+                  </a:lnSpc>
+                </a:pPr>
+                <a:endParaRPr lang="en-US" dirty="0">
+                  <a:solidFill>
+                    <a:srgbClr val="C00000"/>
+                  </a:solidFill>
+                </a:endParaRPr>
+              </a:p>
+            </p:txBody>
+          </p:sp>
+        </mc:Choice>
+        <mc:Fallback>
+          <p:sp>
+            <p:nvSpPr>
+              <p:cNvPr id="28" name="Content Placeholder 2">
+                <a:extLst>
+                  <a:ext uri="{FF2B5EF4-FFF2-40B4-BE49-F238E27FC236}">
+                    <a16:creationId xmlns:a16="http://schemas.microsoft.com/office/drawing/2014/main" id="{B663AEBB-EB90-4D5D-B759-BEC015C34B9A}"/>
+                  </a:ext>
+                </a:extLst>
+              </p:cNvPr>
+              <p:cNvSpPr>
+                <a:spLocks noGrp="1" noRot="1" noChangeAspect="1" noMove="1" noResize="1" noEditPoints="1" noAdjustHandles="1" noChangeArrowheads="1" noChangeShapeType="1" noTextEdit="1"/>
+              </p:cNvSpPr>
+              <p:nvPr>
+                <p:ph idx="1"/>
+              </p:nvPr>
+            </p:nvSpPr>
+            <p:spPr>
+              <a:xfrm>
+                <a:off x="8700115" y="2302299"/>
+                <a:ext cx="3249229" cy="3786943"/>
+              </a:xfrm>
+              <a:blipFill>
+                <a:blip r:embed="rId5"/>
+                <a:stretch>
+                  <a:fillRect l="-2064" t="-966" r="-1689"/>
+                </a:stretch>
+              </a:blipFill>
+            </p:spPr>
+            <p:txBody>
+              <a:bodyPr/>
+              <a:lstStyle/>
+              <a:p>
+                <a:r>
+                  <a:rPr lang="en-US">
+                    <a:noFill/>
+                  </a:rPr>
+                  <a:t> </a:t>
+                </a:r>
+              </a:p>
+            </p:txBody>
+          </p:sp>
+        </mc:Fallback>
+      </mc:AlternateContent>
     </p:spTree>
     <p:extLst>
       <p:ext uri="{BB962C8B-B14F-4D97-AF65-F5344CB8AC3E}">
@@ -26950,8 +27340,8 @@
         </p:nvSpPr>
         <p:spPr>
           <a:xfrm>
-            <a:off x="8744505" y="2302299"/>
-            <a:ext cx="3415365" cy="3786943"/>
+            <a:off x="8691238" y="2302299"/>
+            <a:ext cx="3391272" cy="3786943"/>
           </a:xfrm>
           <a:prstGeom prst="rect">
             <a:avLst/>
@@ -27146,7 +27536,7 @@
                 <a:ea typeface="+mn-ea"/>
                 <a:cs typeface="+mn-cs"/>
               </a:rPr>
-              <a:t>Low RG resolution picture reproduces characteristics of SRC experiments</a:t>
+              <a:t>Reproduces the characteristics of cross section ratios using low RG resolution operator</a:t>
             </a:r>
           </a:p>
           <a:p>
@@ -27518,8 +27908,8 @@
           </a:p>
         </p:txBody>
       </p:sp>
-      <mc:AlternateContent xmlns:mc="http://schemas.openxmlformats.org/markup-compatibility/2006" xmlns:a14="http://schemas.microsoft.com/office/drawing/2010/main">
-        <mc:Choice Requires="a14">
+      <mc:AlternateContent xmlns:mc="http://schemas.openxmlformats.org/markup-compatibility/2006">
+        <mc:Choice xmlns:a14="http://schemas.microsoft.com/office/drawing/2010/main" Requires="a14">
           <p:sp>
             <p:nvSpPr>
               <p:cNvPr id="3" name="Content Placeholder 2">
@@ -27557,7 +27947,7 @@
                       <a:schemeClr val="tx1"/>
                     </a:solidFill>
                   </a:rPr>
-                  <a:t>Ratio should be </a:t>
+                  <a:t>Ratio </a:t>
                 </a:r>
                 <a14:m>
                   <m:oMath xmlns:m="http://schemas.openxmlformats.org/officeDocument/2006/math">
@@ -27611,7 +28001,7 @@
             </p:txBody>
           </p:sp>
         </mc:Choice>
-        <mc:Fallback xmlns="">
+        <mc:Fallback>
           <p:sp>
             <p:nvSpPr>
               <p:cNvPr id="3" name="Content Placeholder 2">
@@ -28030,8 +28420,8 @@
           </a:p>
         </p:txBody>
       </p:sp>
-      <mc:AlternateContent xmlns:mc="http://schemas.openxmlformats.org/markup-compatibility/2006" xmlns:a14="http://schemas.microsoft.com/office/drawing/2010/main">
-        <mc:Choice Requires="a14">
+      <mc:AlternateContent xmlns:mc="http://schemas.openxmlformats.org/markup-compatibility/2006">
+        <mc:Choice xmlns:a14="http://schemas.microsoft.com/office/drawing/2010/main" Requires="a14">
           <p:sp>
             <p:nvSpPr>
               <p:cNvPr id="3" name="Content Placeholder 2">
@@ -28069,7 +28459,7 @@
                       <a:schemeClr val="tx1"/>
                     </a:solidFill>
                   </a:rPr>
-                  <a:t>Ratio should be </a:t>
+                  <a:t>Ratio </a:t>
                 </a:r>
                 <a14:m>
                   <m:oMath xmlns:m="http://schemas.openxmlformats.org/officeDocument/2006/math">
@@ -28208,7 +28598,7 @@
             </p:txBody>
           </p:sp>
         </mc:Choice>
-        <mc:Fallback xmlns="">
+        <mc:Fallback>
           <p:sp>
             <p:nvSpPr>
               <p:cNvPr id="3" name="Content Placeholder 2">
@@ -29631,7 +30021,7 @@
         <p:spPr>
           <a:xfrm>
             <a:off x="201227" y="1825625"/>
-            <a:ext cx="11789546" cy="4351338"/>
+            <a:ext cx="11795760" cy="4351338"/>
           </a:xfrm>
         </p:spPr>
         <p:txBody>
@@ -29692,7 +30082,7 @@
                   <a:srgbClr val="C00000"/>
                 </a:solidFill>
               </a:rPr>
-              <a:t>Extend to cross sections and test scale and scheme dependence of extracted properties</a:t>
+              <a:t>Extend to cross sections and test scale/scheme dependence of extracted properties</a:t>
             </a:r>
           </a:p>
           <a:p>
@@ -30819,7 +31209,7 @@
                   <a:srgbClr val="C00000"/>
                 </a:solidFill>
               </a:rPr>
-              <a:t>Low RG resolution description of SRC physics</a:t>
+              <a:t>Alternative viewpoint</a:t>
             </a:r>
           </a:p>
           <a:p>
@@ -31164,36 +31554,15 @@
             </a:r>
           </a:p>
           <a:p>
-            <a:pPr marL="228600" marR="0" lvl="0" indent="-228600" algn="l" defTabSz="914400" rtl="0" eaLnBrk="1" fontAlgn="auto" latinLnBrk="0" hangingPunct="1">
+            <a:pPr>
               <a:lnSpc>
                 <a:spcPct val="110000"/>
               </a:lnSpc>
-              <a:spcBef>
-                <a:spcPts val="1000"/>
-              </a:spcBef>
-              <a:spcAft>
-                <a:spcPts val="0"/>
-              </a:spcAft>
-              <a:buClrTx/>
-              <a:buSzTx/>
-              <a:buFont typeface="Arial" panose="020B0604020202020204" pitchFamily="34" charset="0"/>
-              <a:buChar char="•"/>
-              <a:tabLst/>
               <a:defRPr/>
             </a:pPr>
             <a:r>
-              <a:rPr kumimoji="0" lang="en-US" sz="2400" b="0" i="0" u="none" strike="noStrike" kern="1200" cap="none" spc="0" normalizeH="0" baseline="0" noProof="0" dirty="0">
-                <a:ln>
-                  <a:noFill/>
-                </a:ln>
-                <a:effectLst/>
-                <a:uLnTx/>
-                <a:uFillTx/>
-                <a:latin typeface="Arial" panose="020B0604020202020204" pitchFamily="34" charset="0"/>
-                <a:ea typeface="+mn-ea"/>
-                <a:cs typeface="+mn-cs"/>
-              </a:rPr>
-              <a:t>Low RG resolution description of SRC physics</a:t>
+              <a:rPr lang="en-US" sz="2400" dirty="0"/>
+              <a:t>Alternative viewpoint</a:t>
             </a:r>
           </a:p>
           <a:p>

</xml_diff>

<commit_message>
Final updates to APS talk
</commit_message>
<xml_diff>
--- a/Presentations/APS_April2021/tropiano_aps_april2021.pptx
+++ b/Presentations/APS_April2021/tropiano_aps_april2021.pptx
@@ -222,7 +222,7 @@
           <a:p>
             <a:fld id="{D6262846-A322-4A91-AADC-BD2991192A7F}" type="datetimeFigureOut">
               <a:rPr lang="en-US" smtClean="0"/>
-              <a:t>4/17/21</a:t>
+              <a:t>4/18/21</a:t>
             </a:fld>
             <a:endParaRPr lang="en-US"/>
           </a:p>
@@ -2136,10 +2136,7 @@
           <a:bodyPr/>
           <a:lstStyle/>
           <a:p>
-            <a:r>
-              <a:rPr lang="en-US" dirty="0"/>
-              <a:t>\lambda bullet point and add arrows to plot.</a:t>
-            </a:r>
+            <a:endParaRPr lang="en-US" dirty="0"/>
           </a:p>
         </p:txBody>
       </p:sp>
@@ -2223,10 +2220,7 @@
           <a:bodyPr/>
           <a:lstStyle/>
           <a:p>
-            <a:r>
-              <a:rPr lang="en-US" dirty="0"/>
-              <a:t>\lambda bullet point and add arrows to plot.</a:t>
-            </a:r>
+            <a:endParaRPr lang="en-US" dirty="0"/>
           </a:p>
         </p:txBody>
       </p:sp>
@@ -2310,18 +2304,7 @@
           <a:bodyPr/>
           <a:lstStyle/>
           <a:p>
-            <a:r>
-              <a:rPr lang="en-US" dirty="0"/>
-              <a:t>Also make sure you say AV18 lies on top of </a:t>
-            </a:r>
-            <a:r>
-              <a:rPr lang="en-US" dirty="0" err="1"/>
-              <a:t>Gezerlis</a:t>
-            </a:r>
-            <a:r>
-              <a:rPr lang="en-US" dirty="0"/>
-              <a:t>. Where does the SRC physics go? Use this as transition into next slide.</a:t>
-            </a:r>
+            <a:endParaRPr lang="en-US" dirty="0"/>
           </a:p>
         </p:txBody>
       </p:sp>
@@ -2736,7 +2719,7 @@
           <a:p>
             <a:fld id="{83694952-25D0-48F3-B9A6-DDD173CFC10B}" type="datetime1">
               <a:rPr lang="en-US" smtClean="0"/>
-              <a:t>4/17/21</a:t>
+              <a:t>4/18/21</a:t>
             </a:fld>
             <a:endParaRPr lang="en-US"/>
           </a:p>
@@ -2937,7 +2920,7 @@
           <a:p>
             <a:fld id="{76740533-62D0-4628-87B8-8B05CAED2D50}" type="datetime1">
               <a:rPr lang="en-US" smtClean="0"/>
-              <a:t>4/17/21</a:t>
+              <a:t>4/18/21</a:t>
             </a:fld>
             <a:endParaRPr lang="en-US"/>
           </a:p>
@@ -3148,7 +3131,7 @@
           <a:p>
             <a:fld id="{8699213E-46D9-4F85-A7A1-AC80546E79AC}" type="datetime1">
               <a:rPr lang="en-US" smtClean="0"/>
-              <a:t>4/17/21</a:t>
+              <a:t>4/18/21</a:t>
             </a:fld>
             <a:endParaRPr lang="en-US"/>
           </a:p>
@@ -3371,7 +3354,7 @@
           <a:p>
             <a:fld id="{0EE1D429-401C-44CA-949A-BAE33D8092F6}" type="datetime1">
               <a:rPr lang="en-US" smtClean="0"/>
-              <a:t>4/17/21</a:t>
+              <a:t>4/18/21</a:t>
             </a:fld>
             <a:endParaRPr lang="en-US"/>
           </a:p>
@@ -3572,7 +3555,7 @@
           <a:p>
             <a:fld id="{9D252D0C-C2D9-4EF2-8A4F-175C25128BC0}" type="datetime1">
               <a:rPr lang="en-US" smtClean="0"/>
-              <a:t>4/17/21</a:t>
+              <a:t>4/18/21</a:t>
             </a:fld>
             <a:endParaRPr lang="en-US"/>
           </a:p>
@@ -3850,7 +3833,7 @@
           <a:p>
             <a:fld id="{5EF3860C-0BFB-4C89-9590-B1B3623EDB0D}" type="datetime1">
               <a:rPr lang="en-US" smtClean="0"/>
-              <a:t>4/17/21</a:t>
+              <a:t>4/18/21</a:t>
             </a:fld>
             <a:endParaRPr lang="en-US"/>
           </a:p>
@@ -4118,7 +4101,7 @@
           <a:p>
             <a:fld id="{E3EA9812-83DA-43A9-9B25-C52DC38DA199}" type="datetime1">
               <a:rPr lang="en-US" smtClean="0"/>
-              <a:t>4/17/21</a:t>
+              <a:t>4/18/21</a:t>
             </a:fld>
             <a:endParaRPr lang="en-US"/>
           </a:p>
@@ -4533,7 +4516,7 @@
           <a:p>
             <a:fld id="{CD2412D8-3B3C-40E7-8FE0-4BC82A5431F2}" type="datetime1">
               <a:rPr lang="en-US" smtClean="0"/>
-              <a:t>4/17/21</a:t>
+              <a:t>4/18/21</a:t>
             </a:fld>
             <a:endParaRPr lang="en-US"/>
           </a:p>
@@ -4677,7 +4660,7 @@
           <a:p>
             <a:fld id="{90A11436-E252-48AF-ACF1-AC7DD58761FA}" type="datetime1">
               <a:rPr lang="en-US" smtClean="0"/>
-              <a:t>4/17/21</a:t>
+              <a:t>4/18/21</a:t>
             </a:fld>
             <a:endParaRPr lang="en-US"/>
           </a:p>
@@ -4793,7 +4776,7 @@
           <a:p>
             <a:fld id="{EB098BCE-4D4A-4908-A9D9-BE2909934289}" type="datetime1">
               <a:rPr lang="en-US" smtClean="0"/>
-              <a:t>4/17/21</a:t>
+              <a:t>4/18/21</a:t>
             </a:fld>
             <a:endParaRPr lang="en-US"/>
           </a:p>
@@ -5107,7 +5090,7 @@
           <a:p>
             <a:fld id="{1E694CEE-F3C9-422B-BA59-418B095FE11F}" type="datetime1">
               <a:rPr lang="en-US" smtClean="0"/>
-              <a:t>4/17/21</a:t>
+              <a:t>4/18/21</a:t>
             </a:fld>
             <a:endParaRPr lang="en-US"/>
           </a:p>
@@ -5308,7 +5291,7 @@
           <a:p>
             <a:fld id="{132F27D5-9D01-4C9A-BAB7-31C96A19A7B4}" type="datetime1">
               <a:rPr lang="en-US" smtClean="0"/>
-              <a:t>4/17/21</a:t>
+              <a:t>4/18/21</a:t>
             </a:fld>
             <a:endParaRPr lang="en-US"/>
           </a:p>
@@ -5602,7 +5585,7 @@
           <a:p>
             <a:fld id="{63086888-0649-4903-A156-E553867CDA81}" type="datetime1">
               <a:rPr lang="en-US" smtClean="0"/>
-              <a:t>4/17/21</a:t>
+              <a:t>4/18/21</a:t>
             </a:fld>
             <a:endParaRPr lang="en-US"/>
           </a:p>
@@ -5803,7 +5786,7 @@
           <a:p>
             <a:fld id="{582833AB-F88C-40CB-B989-3E1E77646775}" type="datetime1">
               <a:rPr lang="en-US" smtClean="0"/>
-              <a:t>4/17/21</a:t>
+              <a:t>4/18/21</a:t>
             </a:fld>
             <a:endParaRPr lang="en-US"/>
           </a:p>
@@ -6014,7 +5997,7 @@
           <a:p>
             <a:fld id="{1DB0E0E5-782A-4B23-8A53-F1C789AB7E0B}" type="datetime1">
               <a:rPr lang="en-US" smtClean="0"/>
-              <a:t>4/17/21</a:t>
+              <a:t>4/18/21</a:t>
             </a:fld>
             <a:endParaRPr lang="en-US"/>
           </a:p>
@@ -6292,7 +6275,7 @@
           <a:p>
             <a:fld id="{C02D90CC-BB54-423D-BF89-BBB7066663F7}" type="datetime1">
               <a:rPr lang="en-US" smtClean="0"/>
-              <a:t>4/17/21</a:t>
+              <a:t>4/18/21</a:t>
             </a:fld>
             <a:endParaRPr lang="en-US"/>
           </a:p>
@@ -6560,7 +6543,7 @@
           <a:p>
             <a:fld id="{D51A8861-A898-447A-A3E7-FCBDC8A3AE97}" type="datetime1">
               <a:rPr lang="en-US" smtClean="0"/>
-              <a:t>4/17/21</a:t>
+              <a:t>4/18/21</a:t>
             </a:fld>
             <a:endParaRPr lang="en-US"/>
           </a:p>
@@ -6975,7 +6958,7 @@
           <a:p>
             <a:fld id="{60F14AFA-7BCD-4FC1-831C-FD67ABE00F70}" type="datetime1">
               <a:rPr lang="en-US" smtClean="0"/>
-              <a:t>4/17/21</a:t>
+              <a:t>4/18/21</a:t>
             </a:fld>
             <a:endParaRPr lang="en-US"/>
           </a:p>
@@ -7119,7 +7102,7 @@
           <a:p>
             <a:fld id="{7778E428-A6A5-4EEE-8780-F0B6EEFB83D5}" type="datetime1">
               <a:rPr lang="en-US" smtClean="0"/>
-              <a:t>4/17/21</a:t>
+              <a:t>4/18/21</a:t>
             </a:fld>
             <a:endParaRPr lang="en-US"/>
           </a:p>
@@ -7235,7 +7218,7 @@
           <a:p>
             <a:fld id="{EC6A4D24-3E18-47B6-8215-733C9684F273}" type="datetime1">
               <a:rPr lang="en-US" smtClean="0"/>
-              <a:t>4/17/21</a:t>
+              <a:t>4/18/21</a:t>
             </a:fld>
             <a:endParaRPr lang="en-US"/>
           </a:p>
@@ -7549,7 +7532,7 @@
           <a:p>
             <a:fld id="{EBD75FB1-F39C-4721-9FBE-5CF18B3498DF}" type="datetime1">
               <a:rPr lang="en-US" smtClean="0"/>
-              <a:t>4/17/21</a:t>
+              <a:t>4/18/21</a:t>
             </a:fld>
             <a:endParaRPr lang="en-US"/>
           </a:p>
@@ -7843,7 +7826,7 @@
           <a:p>
             <a:fld id="{B60509DC-8019-490A-A5C6-1E9B38F9A4ED}" type="datetime1">
               <a:rPr lang="en-US" smtClean="0"/>
-              <a:t>4/17/21</a:t>
+              <a:t>4/18/21</a:t>
             </a:fld>
             <a:endParaRPr lang="en-US"/>
           </a:p>
@@ -8090,7 +8073,7 @@
           <a:p>
             <a:fld id="{2E1A0A7A-E6E7-4480-AADD-98CCD889893F}" type="datetime1">
               <a:rPr lang="en-US" smtClean="0"/>
-              <a:t>4/17/21</a:t>
+              <a:t>4/18/21</a:t>
             </a:fld>
             <a:endParaRPr lang="en-US" dirty="0"/>
           </a:p>
@@ -8669,7 +8652,7 @@
           <a:p>
             <a:fld id="{0DD3B7D1-4027-4C3A-9F2D-D21C2FB6AED5}" type="datetime1">
               <a:rPr lang="en-US" smtClean="0"/>
-              <a:t>4/17/21</a:t>
+              <a:t>4/18/21</a:t>
             </a:fld>
             <a:endParaRPr lang="en-US" dirty="0"/>
           </a:p>
@@ -23266,8 +23249,8 @@
           </a:p>
         </p:txBody>
       </p:sp>
-      <mc:AlternateContent xmlns:mc="http://schemas.openxmlformats.org/markup-compatibility/2006">
-        <mc:Choice xmlns:a14="http://schemas.microsoft.com/office/drawing/2010/main" Requires="a14">
+      <mc:AlternateContent xmlns:mc="http://schemas.openxmlformats.org/markup-compatibility/2006" xmlns:a14="http://schemas.microsoft.com/office/drawing/2010/main">
+        <mc:Choice Requires="a14">
           <p:sp>
             <p:nvSpPr>
               <p:cNvPr id="3" name="Content Placeholder 2">
@@ -23493,7 +23476,7 @@
             </p:txBody>
           </p:sp>
         </mc:Choice>
-        <mc:Fallback>
+        <mc:Fallback xmlns="">
           <p:sp>
             <p:nvSpPr>
               <p:cNvPr id="3" name="Content Placeholder 2">
@@ -23658,8 +23641,8 @@
           </a:p>
         </p:txBody>
       </p:sp>
-      <mc:AlternateContent xmlns:mc="http://schemas.openxmlformats.org/markup-compatibility/2006">
-        <mc:Choice xmlns:a14="http://schemas.microsoft.com/office/drawing/2010/main" Requires="a14">
+      <mc:AlternateContent xmlns:mc="http://schemas.openxmlformats.org/markup-compatibility/2006" xmlns:a14="http://schemas.microsoft.com/office/drawing/2010/main">
+        <mc:Choice Requires="a14">
           <p:sp>
             <p:nvSpPr>
               <p:cNvPr id="8" name="TextBox 7">
@@ -23789,7 +23772,7 @@
             </p:txBody>
           </p:sp>
         </mc:Choice>
-        <mc:Fallback>
+        <mc:Fallback xmlns="">
           <p:sp>
             <p:nvSpPr>
               <p:cNvPr id="8" name="TextBox 7">
@@ -27462,112 +27445,6 @@
       </p:pic>
       <p:sp>
         <p:nvSpPr>
-          <p:cNvPr id="13" name="Rectangle 12">
-            <a:extLst>
-              <a:ext uri="{FF2B5EF4-FFF2-40B4-BE49-F238E27FC236}">
-                <a16:creationId xmlns:a16="http://schemas.microsoft.com/office/drawing/2014/main" id="{315B4248-472C-45D0-B925-68B58013EF10}"/>
-              </a:ext>
-            </a:extLst>
-          </p:cNvPr>
-          <p:cNvSpPr/>
-          <p:nvPr/>
-        </p:nvSpPr>
-        <p:spPr>
-          <a:xfrm>
-            <a:off x="2454814" y="2201662"/>
-            <a:ext cx="451344" cy="3364776"/>
-          </a:xfrm>
-          <a:prstGeom prst="rect">
-            <a:avLst/>
-          </a:prstGeom>
-          <a:solidFill>
-            <a:schemeClr val="bg1">
-              <a:lumMod val="85000"/>
-              <a:alpha val="50000"/>
-            </a:schemeClr>
-          </a:solidFill>
-          <a:ln>
-            <a:noFill/>
-          </a:ln>
-          <a:effectLst>
-            <a:outerShdw blurRad="50800" dist="50800" dir="5400000" algn="ctr" rotWithShape="0">
-              <a:srgbClr val="000000">
-                <a:alpha val="28000"/>
-              </a:srgbClr>
-            </a:outerShdw>
-          </a:effectLst>
-        </p:spPr>
-        <p:style>
-          <a:lnRef idx="2">
-            <a:schemeClr val="accent1">
-              <a:shade val="50000"/>
-            </a:schemeClr>
-          </a:lnRef>
-          <a:fillRef idx="1">
-            <a:schemeClr val="accent1"/>
-          </a:fillRef>
-          <a:effectRef idx="0">
-            <a:schemeClr val="accent1"/>
-          </a:effectRef>
-          <a:fontRef idx="minor">
-            <a:schemeClr val="lt1"/>
-          </a:fontRef>
-        </p:style>
-        <p:txBody>
-          <a:bodyPr rtlCol="0" anchor="ctr"/>
-          <a:lstStyle/>
-          <a:p>
-            <a:pPr algn="ctr"/>
-            <a:endParaRPr lang="en-US" dirty="0"/>
-          </a:p>
-        </p:txBody>
-      </p:sp>
-      <p:cxnSp>
-        <p:nvCxnSpPr>
-          <p:cNvPr id="14" name="Straight Arrow Connector 13">
-            <a:extLst>
-              <a:ext uri="{FF2B5EF4-FFF2-40B4-BE49-F238E27FC236}">
-                <a16:creationId xmlns:a16="http://schemas.microsoft.com/office/drawing/2014/main" id="{9EC76581-7B67-4F1A-87BD-9F256256E0BE}"/>
-              </a:ext>
-            </a:extLst>
-          </p:cNvPr>
-          <p:cNvCxnSpPr>
-            <a:cxnSpLocks/>
-          </p:cNvCxnSpPr>
-          <p:nvPr/>
-        </p:nvCxnSpPr>
-        <p:spPr>
-          <a:xfrm flipH="1">
-            <a:off x="2707829" y="3924425"/>
-            <a:ext cx="396658" cy="31400"/>
-          </a:xfrm>
-          <a:prstGeom prst="straightConnector1">
-            <a:avLst/>
-          </a:prstGeom>
-          <a:ln w="38100">
-            <a:solidFill>
-              <a:srgbClr val="C00000"/>
-            </a:solidFill>
-            <a:tailEnd type="triangle"/>
-          </a:ln>
-        </p:spPr>
-        <p:style>
-          <a:lnRef idx="1">
-            <a:schemeClr val="accent1"/>
-          </a:lnRef>
-          <a:fillRef idx="0">
-            <a:schemeClr val="accent1"/>
-          </a:fillRef>
-          <a:effectRef idx="0">
-            <a:schemeClr val="accent1"/>
-          </a:effectRef>
-          <a:fontRef idx="minor">
-            <a:schemeClr val="tx1"/>
-          </a:fontRef>
-        </p:style>
-      </p:cxnSp>
-      <p:sp>
-        <p:nvSpPr>
           <p:cNvPr id="15" name="TextBox 14">
             <a:extLst>
               <a:ext uri="{FF2B5EF4-FFF2-40B4-BE49-F238E27FC236}">
@@ -27580,7 +27457,7 @@
         </p:nvSpPr>
         <p:spPr>
           <a:xfrm>
-            <a:off x="3104487" y="3699384"/>
+            <a:off x="3310922" y="3429000"/>
             <a:ext cx="1666370" cy="369332"/>
           </a:xfrm>
           <a:prstGeom prst="rect">
@@ -28487,6 +28364,106 @@
           </p:sp>
         </mc:Fallback>
       </mc:AlternateContent>
+      <p:sp>
+        <p:nvSpPr>
+          <p:cNvPr id="5" name="Oval 4">
+            <a:extLst>
+              <a:ext uri="{FF2B5EF4-FFF2-40B4-BE49-F238E27FC236}">
+                <a16:creationId xmlns:a16="http://schemas.microsoft.com/office/drawing/2014/main" id="{772D440B-8140-0344-84AE-1B5F7859EC6A}"/>
+              </a:ext>
+            </a:extLst>
+          </p:cNvPr>
+          <p:cNvSpPr/>
+          <p:nvPr/>
+        </p:nvSpPr>
+        <p:spPr>
+          <a:xfrm>
+            <a:off x="2404861" y="2112892"/>
+            <a:ext cx="498764" cy="2278804"/>
+          </a:xfrm>
+          <a:prstGeom prst="ellipse">
+            <a:avLst/>
+          </a:prstGeom>
+          <a:solidFill>
+            <a:schemeClr val="bg1">
+              <a:lumMod val="75000"/>
+              <a:alpha val="50000"/>
+            </a:schemeClr>
+          </a:solidFill>
+          <a:ln>
+            <a:noFill/>
+          </a:ln>
+        </p:spPr>
+        <p:style>
+          <a:lnRef idx="2">
+            <a:schemeClr val="accent1">
+              <a:shade val="50000"/>
+            </a:schemeClr>
+          </a:lnRef>
+          <a:fillRef idx="1">
+            <a:schemeClr val="accent1"/>
+          </a:fillRef>
+          <a:effectRef idx="0">
+            <a:schemeClr val="accent1"/>
+          </a:effectRef>
+          <a:fontRef idx="minor">
+            <a:schemeClr val="lt1"/>
+          </a:fontRef>
+        </p:style>
+        <p:txBody>
+          <a:bodyPr rtlCol="0" anchor="ctr"/>
+          <a:lstStyle/>
+          <a:p>
+            <a:pPr algn="ctr"/>
+            <a:endParaRPr lang="en-US"/>
+          </a:p>
+        </p:txBody>
+      </p:sp>
+      <p:cxnSp>
+        <p:nvCxnSpPr>
+          <p:cNvPr id="14" name="Straight Arrow Connector 13">
+            <a:extLst>
+              <a:ext uri="{FF2B5EF4-FFF2-40B4-BE49-F238E27FC236}">
+                <a16:creationId xmlns:a16="http://schemas.microsoft.com/office/drawing/2014/main" id="{9EC76581-7B67-4F1A-87BD-9F256256E0BE}"/>
+              </a:ext>
+            </a:extLst>
+          </p:cNvPr>
+          <p:cNvCxnSpPr>
+            <a:cxnSpLocks/>
+            <a:stCxn id="15" idx="1"/>
+          </p:cNvCxnSpPr>
+          <p:nvPr/>
+        </p:nvCxnSpPr>
+        <p:spPr>
+          <a:xfrm flipH="1" flipV="1">
+            <a:off x="2680488" y="3429002"/>
+            <a:ext cx="630434" cy="184664"/>
+          </a:xfrm>
+          <a:prstGeom prst="straightConnector1">
+            <a:avLst/>
+          </a:prstGeom>
+          <a:ln w="38100">
+            <a:solidFill>
+              <a:srgbClr val="FF0000"/>
+            </a:solidFill>
+            <a:tailEnd type="triangle"/>
+          </a:ln>
+        </p:spPr>
+        <p:style>
+          <a:lnRef idx="1">
+            <a:schemeClr val="accent1"/>
+          </a:lnRef>
+          <a:fillRef idx="0">
+            <a:schemeClr val="accent1"/>
+          </a:fillRef>
+          <a:effectRef idx="0">
+            <a:schemeClr val="accent1"/>
+          </a:effectRef>
+          <a:fontRef idx="minor">
+            <a:schemeClr val="tx1"/>
+          </a:fontRef>
+        </p:style>
+      </p:cxnSp>
     </p:spTree>
     <p:extLst>
       <p:ext uri="{BB962C8B-B14F-4D97-AF65-F5344CB8AC3E}">
@@ -28747,50 +28724,6 @@
           </a:p>
         </p:txBody>
       </p:sp>
-      <p:cxnSp>
-        <p:nvCxnSpPr>
-          <p:cNvPr id="10" name="Straight Arrow Connector 9">
-            <a:extLst>
-              <a:ext uri="{FF2B5EF4-FFF2-40B4-BE49-F238E27FC236}">
-                <a16:creationId xmlns:a16="http://schemas.microsoft.com/office/drawing/2014/main" id="{792D56E1-DF6E-4273-937E-693B3FC2119F}"/>
-              </a:ext>
-            </a:extLst>
-          </p:cNvPr>
-          <p:cNvCxnSpPr>
-            <a:cxnSpLocks/>
-          </p:cNvCxnSpPr>
-          <p:nvPr/>
-        </p:nvCxnSpPr>
-        <p:spPr>
-          <a:xfrm flipH="1">
-            <a:off x="1671521" y="4520582"/>
-            <a:ext cx="592285" cy="468984"/>
-          </a:xfrm>
-          <a:prstGeom prst="straightConnector1">
-            <a:avLst/>
-          </a:prstGeom>
-          <a:ln w="38100">
-            <a:solidFill>
-              <a:srgbClr val="C00000"/>
-            </a:solidFill>
-            <a:tailEnd type="triangle"/>
-          </a:ln>
-        </p:spPr>
-        <p:style>
-          <a:lnRef idx="1">
-            <a:schemeClr val="accent1"/>
-          </a:lnRef>
-          <a:fillRef idx="0">
-            <a:schemeClr val="accent1"/>
-          </a:fillRef>
-          <a:effectRef idx="0">
-            <a:schemeClr val="accent1"/>
-          </a:effectRef>
-          <a:fontRef idx="minor">
-            <a:schemeClr val="tx1"/>
-          </a:fontRef>
-        </p:style>
-      </p:cxnSp>
       <p:sp>
         <p:nvSpPr>
           <p:cNvPr id="12" name="TextBox 11">
@@ -28885,6 +28818,50 @@
           </a:p>
         </p:txBody>
       </p:sp>
+      <p:cxnSp>
+        <p:nvCxnSpPr>
+          <p:cNvPr id="10" name="Straight Arrow Connector 9">
+            <a:extLst>
+              <a:ext uri="{FF2B5EF4-FFF2-40B4-BE49-F238E27FC236}">
+                <a16:creationId xmlns:a16="http://schemas.microsoft.com/office/drawing/2014/main" id="{792D56E1-DF6E-4273-937E-693B3FC2119F}"/>
+              </a:ext>
+            </a:extLst>
+          </p:cNvPr>
+          <p:cNvCxnSpPr>
+            <a:cxnSpLocks/>
+          </p:cNvCxnSpPr>
+          <p:nvPr/>
+        </p:nvCxnSpPr>
+        <p:spPr>
+          <a:xfrm flipH="1">
+            <a:off x="1671521" y="4520582"/>
+            <a:ext cx="592285" cy="468984"/>
+          </a:xfrm>
+          <a:prstGeom prst="straightConnector1">
+            <a:avLst/>
+          </a:prstGeom>
+          <a:ln w="38100">
+            <a:solidFill>
+              <a:srgbClr val="FF0000"/>
+            </a:solidFill>
+            <a:tailEnd type="triangle"/>
+          </a:ln>
+        </p:spPr>
+        <p:style>
+          <a:lnRef idx="1">
+            <a:schemeClr val="accent1"/>
+          </a:lnRef>
+          <a:fillRef idx="0">
+            <a:schemeClr val="accent1"/>
+          </a:fillRef>
+          <a:effectRef idx="0">
+            <a:schemeClr val="accent1"/>
+          </a:effectRef>
+          <a:fontRef idx="minor">
+            <a:schemeClr val="tx1"/>
+          </a:fontRef>
+        </p:style>
+      </p:cxnSp>
       <p:sp>
         <p:nvSpPr>
           <p:cNvPr id="17" name="Content Placeholder 2">
@@ -30146,7 +30123,7 @@
           </a:prstGeom>
           <a:ln w="38100">
             <a:solidFill>
-              <a:srgbClr val="C00000"/>
+              <a:srgbClr val="FF0000"/>
             </a:solidFill>
             <a:tailEnd type="triangle"/>
           </a:ln>
@@ -30475,8 +30452,8 @@
           </a:p>
         </p:txBody>
       </p:sp>
-      <mc:AlternateContent xmlns:mc="http://schemas.openxmlformats.org/markup-compatibility/2006">
-        <mc:Choice xmlns:a14="http://schemas.microsoft.com/office/drawing/2010/main" Requires="a14">
+      <mc:AlternateContent xmlns:mc="http://schemas.openxmlformats.org/markup-compatibility/2006" xmlns:a14="http://schemas.microsoft.com/office/drawing/2010/main">
+        <mc:Choice Requires="a14">
           <p:sp>
             <p:nvSpPr>
               <p:cNvPr id="3" name="Content Placeholder 2">
@@ -31249,7 +31226,7 @@
             </p:txBody>
           </p:sp>
         </mc:Choice>
-        <mc:Fallback>
+        <mc:Fallback xmlns="">
           <p:sp>
             <p:nvSpPr>
               <p:cNvPr id="3" name="Content Placeholder 2">
@@ -35511,7 +35488,7 @@
           </a:prstGeom>
           <a:ln w="57150">
             <a:solidFill>
-              <a:srgbClr val="C00000"/>
+              <a:srgbClr val="FF0000"/>
             </a:solidFill>
             <a:tailEnd type="triangle"/>
           </a:ln>
@@ -35555,7 +35532,7 @@
           </a:prstGeom>
           <a:ln w="57150">
             <a:solidFill>
-              <a:srgbClr val="C00000"/>
+              <a:srgbClr val="FF0000"/>
             </a:solidFill>
             <a:tailEnd type="triangle"/>
           </a:ln>

</xml_diff>